<commit_message>
updated feedback and instructions
</commit_message>
<xml_diff>
--- a/src/SE2_TD_nofb/Stimuli/Instructions_Rewarded.pptx
+++ b/src/SE2_TD_nofb/Stimuli/Instructions_Rewarded.pptx
@@ -204,7 +204,7 @@
           <a:p>
             <a:fld id="{62CC9F90-0A1B-4ABF-970D-CD45F3EE6569}" type="datetimeFigureOut">
               <a:rPr lang="fr-FR" smtClean="0"/>
-              <a:t>18/03/2022</a:t>
+              <a:t>30/03/2022</a:t>
             </a:fld>
             <a:endParaRPr lang="fr-FR"/>
           </a:p>
@@ -705,7 +705,7 @@
           <a:p>
             <a:fld id="{53BABFD8-D892-4D56-AE10-021BD01BA1FF}" type="datetimeFigureOut">
               <a:rPr lang="fr-FR" smtClean="0"/>
-              <a:t>18/03/2022</a:t>
+              <a:t>30/03/2022</a:t>
             </a:fld>
             <a:endParaRPr lang="fr-FR"/>
           </a:p>
@@ -903,7 +903,7 @@
           <a:p>
             <a:fld id="{53BABFD8-D892-4D56-AE10-021BD01BA1FF}" type="datetimeFigureOut">
               <a:rPr lang="fr-FR" smtClean="0"/>
-              <a:t>18/03/2022</a:t>
+              <a:t>30/03/2022</a:t>
             </a:fld>
             <a:endParaRPr lang="fr-FR"/>
           </a:p>
@@ -1111,7 +1111,7 @@
           <a:p>
             <a:fld id="{53BABFD8-D892-4D56-AE10-021BD01BA1FF}" type="datetimeFigureOut">
               <a:rPr lang="fr-FR" smtClean="0"/>
-              <a:t>18/03/2022</a:t>
+              <a:t>30/03/2022</a:t>
             </a:fld>
             <a:endParaRPr lang="fr-FR"/>
           </a:p>
@@ -1309,7 +1309,7 @@
           <a:p>
             <a:fld id="{53BABFD8-D892-4D56-AE10-021BD01BA1FF}" type="datetimeFigureOut">
               <a:rPr lang="fr-FR" smtClean="0"/>
-              <a:t>18/03/2022</a:t>
+              <a:t>30/03/2022</a:t>
             </a:fld>
             <a:endParaRPr lang="fr-FR"/>
           </a:p>
@@ -1584,7 +1584,7 @@
           <a:p>
             <a:fld id="{53BABFD8-D892-4D56-AE10-021BD01BA1FF}" type="datetimeFigureOut">
               <a:rPr lang="fr-FR" smtClean="0"/>
-              <a:t>18/03/2022</a:t>
+              <a:t>30/03/2022</a:t>
             </a:fld>
             <a:endParaRPr lang="fr-FR"/>
           </a:p>
@@ -1849,7 +1849,7 @@
           <a:p>
             <a:fld id="{53BABFD8-D892-4D56-AE10-021BD01BA1FF}" type="datetimeFigureOut">
               <a:rPr lang="fr-FR" smtClean="0"/>
-              <a:t>18/03/2022</a:t>
+              <a:t>30/03/2022</a:t>
             </a:fld>
             <a:endParaRPr lang="fr-FR"/>
           </a:p>
@@ -2261,7 +2261,7 @@
           <a:p>
             <a:fld id="{53BABFD8-D892-4D56-AE10-021BD01BA1FF}" type="datetimeFigureOut">
               <a:rPr lang="fr-FR" smtClean="0"/>
-              <a:t>18/03/2022</a:t>
+              <a:t>30/03/2022</a:t>
             </a:fld>
             <a:endParaRPr lang="fr-FR"/>
           </a:p>
@@ -2402,7 +2402,7 @@
           <a:p>
             <a:fld id="{53BABFD8-D892-4D56-AE10-021BD01BA1FF}" type="datetimeFigureOut">
               <a:rPr lang="fr-FR" smtClean="0"/>
-              <a:t>18/03/2022</a:t>
+              <a:t>30/03/2022</a:t>
             </a:fld>
             <a:endParaRPr lang="fr-FR"/>
           </a:p>
@@ -2515,7 +2515,7 @@
           <a:p>
             <a:fld id="{53BABFD8-D892-4D56-AE10-021BD01BA1FF}" type="datetimeFigureOut">
               <a:rPr lang="fr-FR" smtClean="0"/>
-              <a:t>18/03/2022</a:t>
+              <a:t>30/03/2022</a:t>
             </a:fld>
             <a:endParaRPr lang="fr-FR"/>
           </a:p>
@@ -2826,7 +2826,7 @@
           <a:p>
             <a:fld id="{53BABFD8-D892-4D56-AE10-021BD01BA1FF}" type="datetimeFigureOut">
               <a:rPr lang="fr-FR" smtClean="0"/>
-              <a:t>18/03/2022</a:t>
+              <a:t>30/03/2022</a:t>
             </a:fld>
             <a:endParaRPr lang="fr-FR"/>
           </a:p>
@@ -3114,7 +3114,7 @@
           <a:p>
             <a:fld id="{53BABFD8-D892-4D56-AE10-021BD01BA1FF}" type="datetimeFigureOut">
               <a:rPr lang="fr-FR" smtClean="0"/>
-              <a:t>18/03/2022</a:t>
+              <a:t>30/03/2022</a:t>
             </a:fld>
             <a:endParaRPr lang="fr-FR"/>
           </a:p>
@@ -3355,7 +3355,7 @@
           <a:p>
             <a:fld id="{53BABFD8-D892-4D56-AE10-021BD01BA1FF}" type="datetimeFigureOut">
               <a:rPr lang="fr-FR" smtClean="0"/>
-              <a:t>18/03/2022</a:t>
+              <a:t>30/03/2022</a:t>
             </a:fld>
             <a:endParaRPr lang="fr-FR"/>
           </a:p>
@@ -4637,7 +4637,7 @@
                 <a:t>comprend</a:t>
               </a:r>
               <a:r>
-                <a:rPr lang="en-GB" sz="2400"/>
+                <a:rPr lang="en-GB" sz="2400" dirty="0"/>
                 <a:t> 46 </a:t>
               </a:r>
               <a:r>
@@ -4665,7 +4665,15 @@
               <a:pPr algn="ctr"/>
               <a:r>
                 <a:rPr lang="fr-FR" sz="2400" dirty="0"/>
-                <a:t>Chaque exercice de mémoire comprend 5 étapes :</a:t>
+                <a:t>Chaque exercice de mémoire comprend </a:t>
+              </a:r>
+              <a:r>
+                <a:rPr lang="fr-FR" sz="2400" dirty="0" smtClean="0"/>
+                <a:t>4 </a:t>
+              </a:r>
+              <a:r>
+                <a:rPr lang="fr-FR" sz="2400" dirty="0"/>
+                <a:t>étapes :</a:t>
               </a:r>
             </a:p>
             <a:p>
@@ -4760,7 +4768,7 @@
           <p:spPr>
             <a:xfrm>
               <a:off x="2271445" y="2687633"/>
-              <a:ext cx="7649110" cy="1938992"/>
+              <a:ext cx="7649110" cy="1569660"/>
             </a:xfrm>
             <a:prstGeom prst="rect">
               <a:avLst/>
@@ -4811,31 +4819,18 @@
             </a:p>
             <a:p>
               <a:r>
-                <a:rPr lang="fr-FR" sz="2400" b="1" dirty="0" err="1"/>
-                <a:t>Etape</a:t>
-              </a:r>
-              <a:r>
                 <a:rPr lang="fr-FR" sz="2400" b="1" dirty="0"/>
-                <a:t> 4</a:t>
+                <a:t>Etape 4</a:t>
               </a:r>
               <a:r>
                 <a:rPr lang="fr-FR" sz="2400" dirty="0"/>
-                <a:t> : vous vous auto-évaluez</a:t>
-              </a:r>
-            </a:p>
-            <a:p>
-              <a:r>
-                <a:rPr lang="fr-FR" sz="2400" b="1" dirty="0" err="1"/>
-                <a:t>Etape</a:t>
+                <a:t> : vous vous </a:t>
               </a:r>
               <a:r>
-                <a:rPr lang="fr-FR" sz="2400" b="1" dirty="0"/>
-                <a:t> 5</a:t>
+                <a:rPr lang="fr-FR" sz="2400" dirty="0" err="1" smtClean="0"/>
+                <a:t>auto-évaluez</a:t>
               </a:r>
-              <a:r>
-                <a:rPr lang="fr-FR" sz="2400" dirty="0"/>
-                <a:t> : nous vous indiquons votre résultat à l’exercice</a:t>
-              </a:r>
+              <a:endParaRPr lang="fr-FR" sz="2400" dirty="0"/>
             </a:p>
           </p:txBody>
         </p:sp>

</xml_diff>